<commit_message>
boost ia + repartition capacité
</commit_message>
<xml_diff>
--- a/README.pptx
+++ b/README.pptx
@@ -279,7 +279,7 @@
           <a:p>
             <a:fld id="{C4F1E50A-4571-4B4A-874F-A3CA17A17BF4}" type="datetimeFigureOut">
               <a:rPr lang="fr-FR" smtClean="0"/>
-              <a:t>29/05/2017</a:t>
+              <a:t>30/05/2017</a:t>
             </a:fld>
             <a:endParaRPr lang="fr-FR"/>
           </a:p>
@@ -449,7 +449,7 @@
           <a:p>
             <a:fld id="{C4F1E50A-4571-4B4A-874F-A3CA17A17BF4}" type="datetimeFigureOut">
               <a:rPr lang="fr-FR" smtClean="0"/>
-              <a:t>29/05/2017</a:t>
+              <a:t>30/05/2017</a:t>
             </a:fld>
             <a:endParaRPr lang="fr-FR"/>
           </a:p>
@@ -629,7 +629,7 @@
           <a:p>
             <a:fld id="{C4F1E50A-4571-4B4A-874F-A3CA17A17BF4}" type="datetimeFigureOut">
               <a:rPr lang="fr-FR" smtClean="0"/>
-              <a:t>29/05/2017</a:t>
+              <a:t>30/05/2017</a:t>
             </a:fld>
             <a:endParaRPr lang="fr-FR"/>
           </a:p>
@@ -799,7 +799,7 @@
           <a:p>
             <a:fld id="{C4F1E50A-4571-4B4A-874F-A3CA17A17BF4}" type="datetimeFigureOut">
               <a:rPr lang="fr-FR" smtClean="0"/>
-              <a:t>29/05/2017</a:t>
+              <a:t>30/05/2017</a:t>
             </a:fld>
             <a:endParaRPr lang="fr-FR"/>
           </a:p>
@@ -1045,7 +1045,7 @@
           <a:p>
             <a:fld id="{C4F1E50A-4571-4B4A-874F-A3CA17A17BF4}" type="datetimeFigureOut">
               <a:rPr lang="fr-FR" smtClean="0"/>
-              <a:t>29/05/2017</a:t>
+              <a:t>30/05/2017</a:t>
             </a:fld>
             <a:endParaRPr lang="fr-FR"/>
           </a:p>
@@ -1277,7 +1277,7 @@
           <a:p>
             <a:fld id="{C4F1E50A-4571-4B4A-874F-A3CA17A17BF4}" type="datetimeFigureOut">
               <a:rPr lang="fr-FR" smtClean="0"/>
-              <a:t>29/05/2017</a:t>
+              <a:t>30/05/2017</a:t>
             </a:fld>
             <a:endParaRPr lang="fr-FR"/>
           </a:p>
@@ -1644,7 +1644,7 @@
           <a:p>
             <a:fld id="{C4F1E50A-4571-4B4A-874F-A3CA17A17BF4}" type="datetimeFigureOut">
               <a:rPr lang="fr-FR" smtClean="0"/>
-              <a:t>29/05/2017</a:t>
+              <a:t>30/05/2017</a:t>
             </a:fld>
             <a:endParaRPr lang="fr-FR"/>
           </a:p>
@@ -1762,7 +1762,7 @@
           <a:p>
             <a:fld id="{C4F1E50A-4571-4B4A-874F-A3CA17A17BF4}" type="datetimeFigureOut">
               <a:rPr lang="fr-FR" smtClean="0"/>
-              <a:t>29/05/2017</a:t>
+              <a:t>30/05/2017</a:t>
             </a:fld>
             <a:endParaRPr lang="fr-FR"/>
           </a:p>
@@ -1857,7 +1857,7 @@
           <a:p>
             <a:fld id="{C4F1E50A-4571-4B4A-874F-A3CA17A17BF4}" type="datetimeFigureOut">
               <a:rPr lang="fr-FR" smtClean="0"/>
-              <a:t>29/05/2017</a:t>
+              <a:t>30/05/2017</a:t>
             </a:fld>
             <a:endParaRPr lang="fr-FR"/>
           </a:p>
@@ -2134,7 +2134,7 @@
           <a:p>
             <a:fld id="{C4F1E50A-4571-4B4A-874F-A3CA17A17BF4}" type="datetimeFigureOut">
               <a:rPr lang="fr-FR" smtClean="0"/>
-              <a:t>29/05/2017</a:t>
+              <a:t>30/05/2017</a:t>
             </a:fld>
             <a:endParaRPr lang="fr-FR"/>
           </a:p>
@@ -2387,7 +2387,7 @@
           <a:p>
             <a:fld id="{C4F1E50A-4571-4B4A-874F-A3CA17A17BF4}" type="datetimeFigureOut">
               <a:rPr lang="fr-FR" smtClean="0"/>
-              <a:t>29/05/2017</a:t>
+              <a:t>30/05/2017</a:t>
             </a:fld>
             <a:endParaRPr lang="fr-FR"/>
           </a:p>
@@ -2600,7 +2600,7 @@
           <a:p>
             <a:fld id="{C4F1E50A-4571-4B4A-874F-A3CA17A17BF4}" type="datetimeFigureOut">
               <a:rPr lang="fr-FR" smtClean="0"/>
-              <a:t>29/05/2017</a:t>
+              <a:t>30/05/2017</a:t>
             </a:fld>
             <a:endParaRPr lang="fr-FR"/>
           </a:p>
@@ -16912,11 +16912,7 @@
             </a:pPr>
             <a:r>
               <a:rPr lang="fr-FR" sz="2000" dirty="0" smtClean="0"/>
-              <a:t>Game Container : conteneur de jeu (contient les agents de jeu</a:t>
-            </a:r>
-            <a:r>
-              <a:rPr lang="fr-FR" sz="2000" dirty="0" smtClean="0"/>
-              <a:t>)</a:t>
+              <a:t>Game Container : conteneur de jeu (contient les agents de jeu)</a:t>
             </a:r>
           </a:p>
           <a:p>
@@ -16935,7 +16931,6 @@
               <a:rPr lang="fr-FR" sz="2000" dirty="0" smtClean="0"/>
               <a:t>UI Container : conteneur interagissant avec l’UI</a:t>
             </a:r>
-            <a:endParaRPr lang="fr-FR" sz="2000" dirty="0" smtClean="0"/>
           </a:p>
         </p:txBody>
       </p:sp>
@@ -20647,7 +20642,7 @@
         </p:nvSpPr>
         <p:spPr>
           <a:xfrm>
-            <a:off x="1099734" y="2950488"/>
+            <a:off x="1099734" y="2967740"/>
             <a:ext cx="1426705" cy="564210"/>
           </a:xfrm>
           <a:prstGeom prst="roundRect">

</xml_diff>